<commit_message>
Final Project final changes
</commit_message>
<xml_diff>
--- a/Final_Project/INFO6105 - Final Project.pptx
+++ b/Final_Project/INFO6105 - Final Project.pptx
@@ -8,10 +8,12 @@
     <p:sldId id="256" r:id="rId2"/>
     <p:sldId id="257" r:id="rId3"/>
     <p:sldId id="258" r:id="rId4"/>
-    <p:sldId id="259" r:id="rId5"/>
-    <p:sldId id="260" r:id="rId6"/>
-    <p:sldId id="261" r:id="rId7"/>
-    <p:sldId id="262" r:id="rId8"/>
+    <p:sldId id="264" r:id="rId5"/>
+    <p:sldId id="259" r:id="rId6"/>
+    <p:sldId id="263" r:id="rId7"/>
+    <p:sldId id="260" r:id="rId8"/>
+    <p:sldId id="261" r:id="rId9"/>
+    <p:sldId id="262" r:id="rId10"/>
   </p:sldIdLst>
   <p:sldSz cx="12192000" cy="6858000"/>
   <p:notesSz cx="6858000" cy="9144000"/>
@@ -122,6 +124,7 @@
 <p1510:revInfo xmlns:a="http://schemas.openxmlformats.org/drawingml/2006/main" xmlns:r="http://schemas.openxmlformats.org/officeDocument/2006/relationships" xmlns:p1510="http://schemas.microsoft.com/office/powerpoint/2015/10/main">
   <p1510:revLst>
     <p1510:client id="{83921244-E208-49CD-2AEE-518DF94F2B11}" v="343" dt="2022-08-06T17:27:39.060"/>
+    <p1510:client id="{E065F0BC-B752-1BF8-E57C-43A679974CAB}" v="206" dt="2022-08-12T12:20:44.688"/>
     <p1510:client id="{E40E6E98-1BE8-456B-B488-144B7831AED6}" v="34" dt="2022-07-09T21:56:44.263"/>
   </p1510:revLst>
 </p1510:revInfo>
@@ -256,7 +259,7 @@
           <a:p>
             <a:fld id="{C764DE79-268F-4C1A-8933-263129D2AF90}" type="datetimeFigureOut">
               <a:rPr lang="en-US" dirty="0"/>
-              <a:t>8/6/2022</a:t>
+              <a:t>8/12/2022</a:t>
             </a:fld>
             <a:endParaRPr lang="en-US" dirty="0"/>
           </a:p>
@@ -424,7 +427,7 @@
           <a:p>
             <a:fld id="{C764DE79-268F-4C1A-8933-263129D2AF90}" type="datetimeFigureOut">
               <a:rPr lang="en-US" dirty="0"/>
-              <a:t>8/6/2022</a:t>
+              <a:t>8/12/2022</a:t>
             </a:fld>
             <a:endParaRPr lang="en-US" dirty="0"/>
           </a:p>
@@ -602,7 +605,7 @@
           <a:p>
             <a:fld id="{C764DE79-268F-4C1A-8933-263129D2AF90}" type="datetimeFigureOut">
               <a:rPr lang="en-US" dirty="0"/>
-              <a:t>8/6/2022</a:t>
+              <a:t>8/12/2022</a:t>
             </a:fld>
             <a:endParaRPr lang="en-US" dirty="0"/>
           </a:p>
@@ -770,7 +773,7 @@
           <a:p>
             <a:fld id="{C764DE79-268F-4C1A-8933-263129D2AF90}" type="datetimeFigureOut">
               <a:rPr lang="en-US" dirty="0"/>
-              <a:t>8/6/2022</a:t>
+              <a:t>8/12/2022</a:t>
             </a:fld>
             <a:endParaRPr lang="en-US" dirty="0"/>
           </a:p>
@@ -1015,7 +1018,7 @@
           <a:p>
             <a:fld id="{C764DE79-268F-4C1A-8933-263129D2AF90}" type="datetimeFigureOut">
               <a:rPr lang="en-US" dirty="0"/>
-              <a:t>8/6/2022</a:t>
+              <a:t>8/12/2022</a:t>
             </a:fld>
             <a:endParaRPr lang="en-US" dirty="0"/>
           </a:p>
@@ -1244,7 +1247,7 @@
           <a:p>
             <a:fld id="{C764DE79-268F-4C1A-8933-263129D2AF90}" type="datetimeFigureOut">
               <a:rPr lang="en-US" dirty="0"/>
-              <a:t>8/6/2022</a:t>
+              <a:t>8/12/2022</a:t>
             </a:fld>
             <a:endParaRPr lang="en-US" dirty="0"/>
           </a:p>
@@ -1608,7 +1611,7 @@
           <a:p>
             <a:fld id="{C764DE79-268F-4C1A-8933-263129D2AF90}" type="datetimeFigureOut">
               <a:rPr lang="en-US" dirty="0"/>
-              <a:t>8/6/2022</a:t>
+              <a:t>8/12/2022</a:t>
             </a:fld>
             <a:endParaRPr lang="en-US" dirty="0"/>
           </a:p>
@@ -1725,7 +1728,7 @@
           <a:p>
             <a:fld id="{C764DE79-268F-4C1A-8933-263129D2AF90}" type="datetimeFigureOut">
               <a:rPr lang="en-US" dirty="0"/>
-              <a:t>8/6/2022</a:t>
+              <a:t>8/12/2022</a:t>
             </a:fld>
             <a:endParaRPr lang="en-US" dirty="0"/>
           </a:p>
@@ -1820,7 +1823,7 @@
           <a:p>
             <a:fld id="{C764DE79-268F-4C1A-8933-263129D2AF90}" type="datetimeFigureOut">
               <a:rPr lang="en-US" dirty="0"/>
-              <a:t>8/6/2022</a:t>
+              <a:t>8/12/2022</a:t>
             </a:fld>
             <a:endParaRPr lang="en-US" dirty="0"/>
           </a:p>
@@ -2095,7 +2098,7 @@
           <a:p>
             <a:fld id="{C764DE79-268F-4C1A-8933-263129D2AF90}" type="datetimeFigureOut">
               <a:rPr lang="en-US" dirty="0"/>
-              <a:t>8/6/2022</a:t>
+              <a:t>8/12/2022</a:t>
             </a:fld>
             <a:endParaRPr lang="en-US" dirty="0"/>
           </a:p>
@@ -2347,7 +2350,7 @@
           <a:p>
             <a:fld id="{C764DE79-268F-4C1A-8933-263129D2AF90}" type="datetimeFigureOut">
               <a:rPr lang="en-US" dirty="0"/>
-              <a:t>8/6/2022</a:t>
+              <a:t>8/12/2022</a:t>
             </a:fld>
             <a:endParaRPr lang="en-US" dirty="0"/>
           </a:p>
@@ -2558,7 +2561,7 @@
           <a:p>
             <a:fld id="{C764DE79-268F-4C1A-8933-263129D2AF90}" type="datetimeFigureOut">
               <a:rPr lang="en-US" dirty="0"/>
-              <a:t>8/6/2022</a:t>
+              <a:t>8/12/2022</a:t>
             </a:fld>
             <a:endParaRPr lang="en-US" dirty="0"/>
           </a:p>
@@ -3768,13 +3771,13 @@
   <p:clrMapOvr>
     <a:masterClrMapping/>
   </p:clrMapOvr>
-  <mc:AlternateContent xmlns:mc="http://schemas.openxmlformats.org/markup-compatibility/2006">
-    <mc:Choice xmlns:p14="http://schemas.microsoft.com/office/powerpoint/2010/main" Requires="p14">
+  <mc:AlternateContent xmlns:mc="http://schemas.openxmlformats.org/markup-compatibility/2006" xmlns:p14="http://schemas.microsoft.com/office/powerpoint/2010/main">
+    <mc:Choice Requires="p14">
       <p:transition spd="med" p14:dur="700">
         <p:fade/>
       </p:transition>
     </mc:Choice>
-    <mc:Fallback>
+    <mc:Fallback xmlns="">
       <p:transition spd="med">
         <p:fade/>
       </p:transition>
@@ -6608,13 +6611,13 @@
   <p:clrMapOvr>
     <a:masterClrMapping/>
   </p:clrMapOvr>
-  <mc:AlternateContent xmlns:mc="http://schemas.openxmlformats.org/markup-compatibility/2006">
-    <mc:Choice xmlns:p14="http://schemas.microsoft.com/office/powerpoint/2010/main" Requires="p14">
+  <mc:AlternateContent xmlns:mc="http://schemas.openxmlformats.org/markup-compatibility/2006" xmlns:p14="http://schemas.microsoft.com/office/powerpoint/2010/main">
+    <mc:Choice Requires="p14">
       <p:transition spd="med" p14:dur="700">
         <p:fade/>
       </p:transition>
     </mc:Choice>
-    <mc:Fallback>
+    <mc:Fallback xmlns="">
       <p:transition spd="med">
         <p:fade/>
       </p:transition>
@@ -9160,13 +9163,13 @@
   <p:clrMapOvr>
     <a:masterClrMapping/>
   </p:clrMapOvr>
-  <mc:AlternateContent xmlns:mc="http://schemas.openxmlformats.org/markup-compatibility/2006">
-    <mc:Choice xmlns:p14="http://schemas.microsoft.com/office/powerpoint/2010/main" Requires="p14">
+  <mc:AlternateContent xmlns:mc="http://schemas.openxmlformats.org/markup-compatibility/2006" xmlns:p14="http://schemas.microsoft.com/office/powerpoint/2010/main">
+    <mc:Choice Requires="p14">
       <p:transition spd="med" p14:dur="700">
         <p:fade/>
       </p:transition>
     </mc:Choice>
-    <mc:Fallback>
+    <mc:Fallback xmlns="">
       <p:transition spd="med">
         <p:fade/>
       </p:transition>
@@ -9176,6 +9179,370 @@
 </file>
 
 <file path=ppt/slides/slide4.xml><?xml version="1.0" encoding="utf-8"?>
+<p:sld xmlns:a="http://schemas.openxmlformats.org/drawingml/2006/main" xmlns:r="http://schemas.openxmlformats.org/officeDocument/2006/relationships" xmlns:p="http://schemas.openxmlformats.org/presentationml/2006/main">
+  <p:cSld>
+    <p:bg>
+      <p:bgPr>
+        <a:solidFill>
+          <a:schemeClr val="bg1"/>
+        </a:solidFill>
+        <a:effectLst/>
+      </p:bgPr>
+    </p:bg>
+    <p:spTree>
+      <p:nvGrpSpPr>
+        <p:cNvPr id="1" name=""/>
+        <p:cNvGrpSpPr/>
+        <p:nvPr/>
+      </p:nvGrpSpPr>
+      <p:grpSpPr>
+        <a:xfrm>
+          <a:off x="0" y="0"/>
+          <a:ext cx="0" cy="0"/>
+          <a:chOff x="0" y="0"/>
+          <a:chExt cx="0" cy="0"/>
+        </a:xfrm>
+      </p:grpSpPr>
+      <p:pic>
+        <p:nvPicPr>
+          <p:cNvPr id="4" name="Picture 4" descr="Chart, treemap chart&#10;&#10;Description automatically generated">
+            <a:extLst>
+              <a:ext uri="{FF2B5EF4-FFF2-40B4-BE49-F238E27FC236}">
+                <a16:creationId xmlns:a16="http://schemas.microsoft.com/office/drawing/2014/main" id="{46F102A6-2863-96D1-2B88-E303228A0BDA}"/>
+              </a:ext>
+            </a:extLst>
+          </p:cNvPr>
+          <p:cNvPicPr>
+            <a:picLocks noGrp="1" noChangeAspect="1"/>
+          </p:cNvPicPr>
+          <p:nvPr>
+            <p:ph idx="1"/>
+          </p:nvPr>
+        </p:nvPicPr>
+        <p:blipFill rotWithShape="1">
+          <a:blip r:embed="rId2"/>
+          <a:srcRect b="7408"/>
+          <a:stretch/>
+        </p:blipFill>
+        <p:spPr>
+          <a:xfrm>
+            <a:off x="-1" y="10"/>
+            <a:ext cx="12192000" cy="6857990"/>
+          </a:xfrm>
+          <a:prstGeom prst="rect">
+            <a:avLst/>
+          </a:prstGeom>
+        </p:spPr>
+      </p:pic>
+      <p:sp>
+        <p:nvSpPr>
+          <p:cNvPr id="37" name="Freeform 5">
+            <a:extLst>
+              <a:ext uri="{FF2B5EF4-FFF2-40B4-BE49-F238E27FC236}">
+                <a16:creationId xmlns:a16="http://schemas.microsoft.com/office/drawing/2014/main" id="{3CD9DF72-87A3-404E-A828-84CBF11A8303}"/>
+              </a:ext>
+              <a:ext uri="{C183D7F6-B498-43B3-948B-1728B52AA6E4}">
+                <adec:decorative xmlns:adec="http://schemas.microsoft.com/office/drawing/2017/decorative" val="1"/>
+              </a:ext>
+            </a:extLst>
+          </p:cNvPr>
+          <p:cNvSpPr>
+            <a:spLocks noGrp="1" noRot="1" noChangeAspect="1" noMove="1" noResize="1" noEditPoints="1" noAdjustHandles="1" noChangeArrowheads="1" noChangeShapeType="1" noTextEdit="1"/>
+          </p:cNvSpPr>
+          <p:nvPr>
+            <p:extLst>
+              <p:ext uri="{386F3935-93C4-4BCD-93E2-E3B085C9AB24}">
+                <p16:designElem xmlns:p16="http://schemas.microsoft.com/office/powerpoint/2015/main" val="1"/>
+              </p:ext>
+            </p:extLst>
+          </p:nvPr>
+        </p:nvSpPr>
+        <p:spPr bwMode="grayWhite">
+          <a:xfrm flipH="1">
+            <a:off x="0" y="998175"/>
+            <a:ext cx="6017172" cy="5859825"/>
+          </a:xfrm>
+          <a:custGeom>
+            <a:avLst/>
+            <a:gdLst>
+              <a:gd name="T0" fmla="*/ 1333 w 1333"/>
+              <a:gd name="T1" fmla="*/ 1031 h 1298"/>
+              <a:gd name="T2" fmla="*/ 1333 w 1333"/>
+              <a:gd name="T3" fmla="*/ 380 h 1298"/>
+              <a:gd name="T4" fmla="*/ 706 w 1333"/>
+              <a:gd name="T5" fmla="*/ 0 h 1298"/>
+              <a:gd name="T6" fmla="*/ 0 w 1333"/>
+              <a:gd name="T7" fmla="*/ 706 h 1298"/>
+              <a:gd name="T8" fmla="*/ 323 w 1333"/>
+              <a:gd name="T9" fmla="*/ 1298 h 1298"/>
+              <a:gd name="T10" fmla="*/ 1090 w 1333"/>
+              <a:gd name="T11" fmla="*/ 1298 h 1298"/>
+              <a:gd name="T12" fmla="*/ 1333 w 1333"/>
+              <a:gd name="T13" fmla="*/ 1031 h 1298"/>
+            </a:gdLst>
+            <a:ahLst/>
+            <a:cxnLst>
+              <a:cxn ang="0">
+                <a:pos x="T0" y="T1"/>
+              </a:cxn>
+              <a:cxn ang="0">
+                <a:pos x="T2" y="T3"/>
+              </a:cxn>
+              <a:cxn ang="0">
+                <a:pos x="T4" y="T5"/>
+              </a:cxn>
+              <a:cxn ang="0">
+                <a:pos x="T6" y="T7"/>
+              </a:cxn>
+              <a:cxn ang="0">
+                <a:pos x="T8" y="T9"/>
+              </a:cxn>
+              <a:cxn ang="0">
+                <a:pos x="T10" y="T11"/>
+              </a:cxn>
+              <a:cxn ang="0">
+                <a:pos x="T12" y="T13"/>
+              </a:cxn>
+            </a:cxnLst>
+            <a:rect l="0" t="0" r="r" b="b"/>
+            <a:pathLst>
+              <a:path w="1333" h="1298">
+                <a:moveTo>
+                  <a:pt x="1333" y="1031"/>
+                </a:moveTo>
+                <a:cubicBezTo>
+                  <a:pt x="1333" y="380"/>
+                  <a:pt x="1333" y="380"/>
+                  <a:pt x="1333" y="380"/>
+                </a:cubicBezTo>
+                <a:cubicBezTo>
+                  <a:pt x="1215" y="154"/>
+                  <a:pt x="979" y="0"/>
+                  <a:pt x="706" y="0"/>
+                </a:cubicBezTo>
+                <a:cubicBezTo>
+                  <a:pt x="317" y="0"/>
+                  <a:pt x="0" y="316"/>
+                  <a:pt x="0" y="706"/>
+                </a:cubicBezTo>
+                <a:cubicBezTo>
+                  <a:pt x="0" y="954"/>
+                  <a:pt x="129" y="1172"/>
+                  <a:pt x="323" y="1298"/>
+                </a:cubicBezTo>
+                <a:cubicBezTo>
+                  <a:pt x="1090" y="1298"/>
+                  <a:pt x="1090" y="1298"/>
+                  <a:pt x="1090" y="1298"/>
+                </a:cubicBezTo>
+                <a:cubicBezTo>
+                  <a:pt x="1193" y="1232"/>
+                  <a:pt x="1276" y="1140"/>
+                  <a:pt x="1333" y="1031"/>
+                </a:cubicBezTo>
+                <a:close/>
+              </a:path>
+            </a:pathLst>
+          </a:custGeom>
+          <a:solidFill>
+            <a:schemeClr val="bg1">
+              <a:alpha val="75000"/>
+            </a:schemeClr>
+          </a:solidFill>
+          <a:ln w="50800" cap="sq" cmpd="dbl">
+            <a:noFill/>
+            <a:miter lim="800000"/>
+          </a:ln>
+          <a:effectLst/>
+        </p:spPr>
+        <p:txBody>
+          <a:bodyPr vert="horz" lIns="91440" tIns="45720" rIns="91440" bIns="45720" rtlCol="0" anchor="t">
+            <a:normAutofit/>
+          </a:bodyPr>
+          <a:lstStyle/>
+          <a:p>
+            <a:pPr algn="ctr">
+              <a:spcAft>
+                <a:spcPts val="1000"/>
+              </a:spcAft>
+              <a:buClr>
+                <a:schemeClr val="tx1"/>
+              </a:buClr>
+              <a:buSzPct val="100000"/>
+              <a:buFont typeface="Arial"/>
+              <a:buNone/>
+            </a:pPr>
+            <a:endParaRPr lang="en-US" sz="1600" cap="all"/>
+          </a:p>
+        </p:txBody>
+      </p:sp>
+      <p:sp>
+        <p:nvSpPr>
+          <p:cNvPr id="2" name="Title 1">
+            <a:extLst>
+              <a:ext uri="{FF2B5EF4-FFF2-40B4-BE49-F238E27FC236}">
+                <a16:creationId xmlns:a16="http://schemas.microsoft.com/office/drawing/2014/main" id="{7D0FCAA7-8376-A9EA-CA76-02175E33902F}"/>
+              </a:ext>
+            </a:extLst>
+          </p:cNvPr>
+          <p:cNvSpPr>
+            <a:spLocks noGrp="1"/>
+          </p:cNvSpPr>
+          <p:nvPr>
+            <p:ph type="title"/>
+          </p:nvPr>
+        </p:nvSpPr>
+        <p:spPr>
+          <a:xfrm>
+            <a:off x="709448" y="1913950"/>
+            <a:ext cx="4204137" cy="1342754"/>
+          </a:xfrm>
+        </p:spPr>
+        <p:txBody>
+          <a:bodyPr vert="horz" lIns="91440" tIns="45720" rIns="91440" bIns="45720" rtlCol="0" anchor="ctr">
+            <a:normAutofit/>
+          </a:bodyPr>
+          <a:lstStyle/>
+          <a:p>
+            <a:pPr algn="ctr"/>
+            <a:r>
+              <a:rPr lang="en-US" sz="3600"/>
+              <a:t>Data Analysis &amp; Visualization</a:t>
+            </a:r>
+          </a:p>
+        </p:txBody>
+      </p:sp>
+      <p:cxnSp>
+        <p:nvCxnSpPr>
+          <p:cNvPr id="39" name="Straight Connector 38">
+            <a:extLst>
+              <a:ext uri="{FF2B5EF4-FFF2-40B4-BE49-F238E27FC236}">
+                <a16:creationId xmlns:a16="http://schemas.microsoft.com/office/drawing/2014/main" id="{20E3A342-4D61-4E3F-AF90-1AB42AEB96CC}"/>
+              </a:ext>
+              <a:ext uri="{C183D7F6-B498-43B3-948B-1728B52AA6E4}">
+                <adec:decorative xmlns:adec="http://schemas.microsoft.com/office/drawing/2017/decorative" val="1"/>
+              </a:ext>
+            </a:extLst>
+          </p:cNvPr>
+          <p:cNvCxnSpPr>
+            <a:cxnSpLocks noGrp="1" noRot="1" noChangeAspect="1" noMove="1" noResize="1" noEditPoints="1" noAdjustHandles="1" noChangeArrowheads="1" noChangeShapeType="1"/>
+          </p:cNvCxnSpPr>
+          <p:nvPr>
+            <p:extLst>
+              <p:ext uri="{386F3935-93C4-4BCD-93E2-E3B085C9AB24}">
+                <p16:designElem xmlns:p16="http://schemas.microsoft.com/office/powerpoint/2015/main" val="1"/>
+              </p:ext>
+            </p:extLst>
+          </p:nvPr>
+        </p:nvCxnSpPr>
+        <p:spPr>
+          <a:xfrm>
+            <a:off x="2287051" y="3337139"/>
+            <a:ext cx="935420" cy="0"/>
+          </a:xfrm>
+          <a:prstGeom prst="line">
+            <a:avLst/>
+          </a:prstGeom>
+          <a:ln w="25400" cap="sq">
+            <a:solidFill>
+              <a:schemeClr val="tx1">
+                <a:lumMod val="85000"/>
+                <a:lumOff val="15000"/>
+              </a:schemeClr>
+            </a:solidFill>
+            <a:bevel/>
+          </a:ln>
+        </p:spPr>
+        <p:style>
+          <a:lnRef idx="1">
+            <a:schemeClr val="accent1"/>
+          </a:lnRef>
+          <a:fillRef idx="0">
+            <a:schemeClr val="accent1"/>
+          </a:fillRef>
+          <a:effectRef idx="0">
+            <a:schemeClr val="accent1"/>
+          </a:effectRef>
+          <a:fontRef idx="minor">
+            <a:schemeClr val="tx1"/>
+          </a:fontRef>
+        </p:style>
+      </p:cxnSp>
+      <p:sp>
+        <p:nvSpPr>
+          <p:cNvPr id="5" name="TextBox 4">
+            <a:extLst>
+              <a:ext uri="{FF2B5EF4-FFF2-40B4-BE49-F238E27FC236}">
+                <a16:creationId xmlns:a16="http://schemas.microsoft.com/office/drawing/2014/main" id="{2902C12F-6290-F1B3-9DE8-26AD88445427}"/>
+              </a:ext>
+            </a:extLst>
+          </p:cNvPr>
+          <p:cNvSpPr txBox="1"/>
+          <p:nvPr/>
+        </p:nvSpPr>
+        <p:spPr>
+          <a:xfrm>
+            <a:off x="525516" y="3417573"/>
+            <a:ext cx="4593021" cy="2619839"/>
+          </a:xfrm>
+          <a:prstGeom prst="rect">
+            <a:avLst/>
+          </a:prstGeom>
+        </p:spPr>
+        <p:txBody>
+          <a:bodyPr rot="0" spcFirstLastPara="0" vertOverflow="overflow" horzOverflow="overflow" vert="horz" lIns="91440" tIns="45720" rIns="91440" bIns="45720" numCol="1" spcCol="0" rtlCol="0" fromWordArt="0" anchor="ctr" anchorCtr="0" forceAA="0" compatLnSpc="1">
+            <a:prstTxWarp prst="textNoShape">
+              <a:avLst/>
+            </a:prstTxWarp>
+            <a:normAutofit/>
+          </a:bodyPr>
+          <a:lstStyle/>
+          <a:p>
+            <a:pPr indent="-228600">
+              <a:lnSpc>
+                <a:spcPct val="90000"/>
+              </a:lnSpc>
+              <a:spcAft>
+                <a:spcPts val="600"/>
+              </a:spcAft>
+              <a:buFont typeface="Arial" panose="020B0604020202020204" pitchFamily="34" charset="0"/>
+              <a:buChar char="•"/>
+            </a:pPr>
+            <a:r>
+              <a:rPr lang="en-US" b="1"/>
+              <a:t>Some Observations from the HeatMap</a:t>
+            </a:r>
+            <a:r>
+              <a:rPr lang="en-US"/>
+              <a:t>:</a:t>
+            </a:r>
+            <a:br>
+              <a:rPr lang="en-US"/>
+            </a:br>
+            <a:br>
+              <a:rPr lang="en-US"/>
+            </a:br>
+            <a:r>
+              <a:rPr lang="en-US"/>
+              <a:t>The best features with the highest correlation which are used for feature engineering are acousticness, instrumentalness, loudness and energy</a:t>
+            </a:r>
+          </a:p>
+        </p:txBody>
+      </p:sp>
+    </p:spTree>
+    <p:extLst>
+      <p:ext uri="{BB962C8B-B14F-4D97-AF65-F5344CB8AC3E}">
+        <p14:creationId xmlns:p14="http://schemas.microsoft.com/office/powerpoint/2010/main" val="3558538579"/>
+      </p:ext>
+    </p:extLst>
+  </p:cSld>
+  <p:clrMapOvr>
+    <a:masterClrMapping/>
+  </p:clrMapOvr>
+</p:sld>
+</file>
+
+<file path=ppt/slides/slide5.xml><?xml version="1.0" encoding="utf-8"?>
 <p:sld xmlns:a="http://schemas.openxmlformats.org/drawingml/2006/main" xmlns:r="http://schemas.openxmlformats.org/officeDocument/2006/relationships" xmlns:p="http://schemas.openxmlformats.org/presentationml/2006/main">
   <p:cSld>
     <p:bg>
@@ -9724,13 +10091,13 @@
   <p:clrMapOvr>
     <a:masterClrMapping/>
   </p:clrMapOvr>
-  <mc:AlternateContent xmlns:mc="http://schemas.openxmlformats.org/markup-compatibility/2006">
-    <mc:Choice xmlns:p14="http://schemas.microsoft.com/office/powerpoint/2010/main" Requires="p14">
+  <mc:AlternateContent xmlns:mc="http://schemas.openxmlformats.org/markup-compatibility/2006" xmlns:p14="http://schemas.microsoft.com/office/powerpoint/2010/main">
+    <mc:Choice Requires="p14">
       <p:transition spd="med" p14:dur="700">
         <p:fade/>
       </p:transition>
     </mc:Choice>
-    <mc:Fallback>
+    <mc:Fallback xmlns="">
       <p:transition spd="med">
         <p:fade/>
       </p:transition>
@@ -9739,7 +10106,193 @@
 </p:sld>
 </file>
 
-<file path=ppt/slides/slide5.xml><?xml version="1.0" encoding="utf-8"?>
+<file path=ppt/slides/slide6.xml><?xml version="1.0" encoding="utf-8"?>
+<p:sld xmlns:a="http://schemas.openxmlformats.org/drawingml/2006/main" xmlns:r="http://schemas.openxmlformats.org/officeDocument/2006/relationships" xmlns:p="http://schemas.openxmlformats.org/presentationml/2006/main">
+  <p:cSld>
+    <p:bg>
+      <p:bgPr>
+        <a:solidFill>
+          <a:schemeClr val="bg1"/>
+        </a:solidFill>
+        <a:effectLst/>
+      </p:bgPr>
+    </p:bg>
+    <p:spTree>
+      <p:nvGrpSpPr>
+        <p:cNvPr id="1" name=""/>
+        <p:cNvGrpSpPr/>
+        <p:nvPr/>
+      </p:nvGrpSpPr>
+      <p:grpSpPr>
+        <a:xfrm>
+          <a:off x="0" y="0"/>
+          <a:ext cx="0" cy="0"/>
+          <a:chOff x="0" y="0"/>
+          <a:chExt cx="0" cy="0"/>
+        </a:xfrm>
+      </p:grpSpPr>
+      <p:sp>
+        <p:nvSpPr>
+          <p:cNvPr id="2" name="Title 1">
+            <a:extLst>
+              <a:ext uri="{FF2B5EF4-FFF2-40B4-BE49-F238E27FC236}">
+                <a16:creationId xmlns:a16="http://schemas.microsoft.com/office/drawing/2014/main" id="{84BCAECF-320B-294B-8A57-75279052662D}"/>
+              </a:ext>
+            </a:extLst>
+          </p:cNvPr>
+          <p:cNvSpPr>
+            <a:spLocks noGrp="1"/>
+          </p:cNvSpPr>
+          <p:nvPr>
+            <p:ph type="title"/>
+          </p:nvPr>
+        </p:nvSpPr>
+        <p:spPr>
+          <a:xfrm>
+            <a:off x="481013" y="3752849"/>
+            <a:ext cx="3290887" cy="2452687"/>
+          </a:xfrm>
+        </p:spPr>
+        <p:txBody>
+          <a:bodyPr anchor="ctr">
+            <a:normAutofit/>
+          </a:bodyPr>
+          <a:lstStyle/>
+          <a:p>
+            <a:r>
+              <a:rPr lang="en-US" sz="3600">
+                <a:cs typeface="Calibri Light"/>
+              </a:rPr>
+              <a:t>Splitting Data for attaining max accuracy</a:t>
+            </a:r>
+            <a:endParaRPr lang="en-US" sz="3600"/>
+          </a:p>
+        </p:txBody>
+      </p:sp>
+      <p:pic>
+        <p:nvPicPr>
+          <p:cNvPr id="5" name="Picture 5" descr="Text&#10;&#10;Description automatically generated">
+            <a:extLst>
+              <a:ext uri="{FF2B5EF4-FFF2-40B4-BE49-F238E27FC236}">
+                <a16:creationId xmlns:a16="http://schemas.microsoft.com/office/drawing/2014/main" id="{7041D6AC-4805-A017-E635-6980100A143F}"/>
+              </a:ext>
+            </a:extLst>
+          </p:cNvPr>
+          <p:cNvPicPr>
+            <a:picLocks noChangeAspect="1"/>
+          </p:cNvPicPr>
+          <p:nvPr/>
+        </p:nvPicPr>
+        <p:blipFill rotWithShape="1">
+          <a:blip r:embed="rId2"/>
+          <a:srcRect l="4492" r="19115"/>
+          <a:stretch/>
+        </p:blipFill>
+        <p:spPr>
+          <a:xfrm>
+            <a:off x="20" y="10"/>
+            <a:ext cx="12191980" cy="3710603"/>
+          </a:xfrm>
+          <a:custGeom>
+            <a:avLst/>
+            <a:gdLst/>
+            <a:ahLst/>
+            <a:cxnLst/>
+            <a:rect l="l" t="t" r="r" b="b"/>
+            <a:pathLst>
+              <a:path w="12192000" h="3692092">
+                <a:moveTo>
+                  <a:pt x="0" y="0"/>
+                </a:moveTo>
+                <a:lnTo>
+                  <a:pt x="12192000" y="0"/>
+                </a:lnTo>
+                <a:lnTo>
+                  <a:pt x="12192000" y="3504824"/>
+                </a:lnTo>
+                <a:lnTo>
+                  <a:pt x="12024691" y="3517794"/>
+                </a:lnTo>
+                <a:cubicBezTo>
+                  <a:pt x="8077523" y="3783195"/>
+                  <a:pt x="4094678" y="3026959"/>
+                  <a:pt x="160485" y="3663863"/>
+                </a:cubicBezTo>
+                <a:lnTo>
+                  <a:pt x="0" y="3692092"/>
+                </a:lnTo>
+                <a:close/>
+              </a:path>
+            </a:pathLst>
+          </a:custGeom>
+        </p:spPr>
+      </p:pic>
+      <p:sp>
+        <p:nvSpPr>
+          <p:cNvPr id="3" name="Content Placeholder 2">
+            <a:extLst>
+              <a:ext uri="{FF2B5EF4-FFF2-40B4-BE49-F238E27FC236}">
+                <a16:creationId xmlns:a16="http://schemas.microsoft.com/office/drawing/2014/main" id="{C8B76939-989B-BD0F-D855-D2B0CEBF92CD}"/>
+              </a:ext>
+            </a:extLst>
+          </p:cNvPr>
+          <p:cNvSpPr>
+            <a:spLocks noGrp="1"/>
+          </p:cNvSpPr>
+          <p:nvPr>
+            <p:ph idx="1"/>
+          </p:nvPr>
+        </p:nvSpPr>
+        <p:spPr>
+          <a:xfrm>
+            <a:off x="4223982" y="3752850"/>
+            <a:ext cx="7485413" cy="2452687"/>
+          </a:xfrm>
+        </p:spPr>
+        <p:txBody>
+          <a:bodyPr vert="horz" lIns="91440" tIns="45720" rIns="91440" bIns="45720" rtlCol="0" anchor="ctr">
+            <a:normAutofit/>
+          </a:bodyPr>
+          <a:lstStyle/>
+          <a:p>
+            <a:pPr marL="0" indent="0">
+              <a:buNone/>
+            </a:pPr>
+            <a:r>
+              <a:rPr lang="en-US" sz="1800">
+                <a:cs typeface="Calibri"/>
+              </a:rPr>
+              <a:t>We have split data in test, train and validation dataset and build the model and received an </a:t>
+            </a:r>
+            <a:r>
+              <a:rPr lang="en-US" sz="1800" b="1">
+                <a:cs typeface="Calibri"/>
+              </a:rPr>
+              <a:t>80% accuracy</a:t>
+            </a:r>
+            <a:r>
+              <a:rPr lang="en-US" sz="1800">
+                <a:cs typeface="Calibri"/>
+              </a:rPr>
+              <a:t> on the validation dataset.</a:t>
+            </a:r>
+          </a:p>
+        </p:txBody>
+      </p:sp>
+    </p:spTree>
+    <p:extLst>
+      <p:ext uri="{BB962C8B-B14F-4D97-AF65-F5344CB8AC3E}">
+        <p14:creationId xmlns:p14="http://schemas.microsoft.com/office/powerpoint/2010/main" val="3988518680"/>
+      </p:ext>
+    </p:extLst>
+  </p:cSld>
+  <p:clrMapOvr>
+    <a:masterClrMapping/>
+  </p:clrMapOvr>
+</p:sld>
+</file>
+
+<file path=ppt/slides/slide7.xml><?xml version="1.0" encoding="utf-8"?>
 <p:sld xmlns:a="http://schemas.openxmlformats.org/drawingml/2006/main" xmlns:r="http://schemas.openxmlformats.org/officeDocument/2006/relationships" xmlns:p="http://schemas.openxmlformats.org/presentationml/2006/main">
   <p:cSld>
     <p:bg>
@@ -13188,13 +13741,13 @@
   <p:clrMapOvr>
     <a:masterClrMapping/>
   </p:clrMapOvr>
-  <mc:AlternateContent xmlns:mc="http://schemas.openxmlformats.org/markup-compatibility/2006">
-    <mc:Choice xmlns:p14="http://schemas.microsoft.com/office/powerpoint/2010/main" Requires="p14">
+  <mc:AlternateContent xmlns:mc="http://schemas.openxmlformats.org/markup-compatibility/2006" xmlns:p14="http://schemas.microsoft.com/office/powerpoint/2010/main">
+    <mc:Choice Requires="p14">
       <p:transition spd="med" p14:dur="700">
         <p:fade/>
       </p:transition>
     </mc:Choice>
-    <mc:Fallback>
+    <mc:Fallback xmlns="">
       <p:transition spd="med">
         <p:fade/>
       </p:transition>
@@ -13203,7 +13756,7 @@
 </p:sld>
 </file>
 
-<file path=ppt/slides/slide6.xml><?xml version="1.0" encoding="utf-8"?>
+<file path=ppt/slides/slide8.xml><?xml version="1.0" encoding="utf-8"?>
 <p:sld xmlns:a="http://schemas.openxmlformats.org/drawingml/2006/main" xmlns:r="http://schemas.openxmlformats.org/officeDocument/2006/relationships" xmlns:p="http://schemas.openxmlformats.org/presentationml/2006/main">
   <p:cSld>
     <p:bg>
@@ -15566,10 +16119,34 @@
               <a:buNone/>
             </a:pPr>
             <a:r>
-              <a:rPr lang="en-US" sz="1800">
+              <a:rPr lang="en-US" sz="1800" dirty="0">
                 <a:cs typeface="Calibri"/>
               </a:rPr>
-              <a:t>We trained our model, performed hyperparamter tuning and KNN classification model was the best fit for this type of data which received an accuracy score of approximately 74% which ensures no overfitting or underfitting of data.</a:t>
+              <a:t>We trained our model, performed </a:t>
+            </a:r>
+            <a:r>
+              <a:rPr lang="en-US" sz="1800" dirty="0" err="1">
+                <a:cs typeface="Calibri"/>
+              </a:rPr>
+              <a:t>hyperparamter</a:t>
+            </a:r>
+            <a:r>
+              <a:rPr lang="en-US" sz="1800" dirty="0">
+                <a:cs typeface="Calibri"/>
+              </a:rPr>
+              <a:t> tuning and KNN classification model was the best fit for this type of data which received an accuracy score of </a:t>
+            </a:r>
+            <a:r>
+              <a:rPr lang="en-US" sz="1800" b="1" dirty="0">
+                <a:cs typeface="Calibri"/>
+              </a:rPr>
+              <a:t>approximately 76%</a:t>
+            </a:r>
+            <a:r>
+              <a:rPr lang="en-US" sz="1800" dirty="0">
+                <a:cs typeface="Calibri"/>
+              </a:rPr>
+              <a:t> which ensures no overfitting or underfitting of data.</a:t>
             </a:r>
           </a:p>
         </p:txBody>
@@ -15643,10 +16220,10 @@
       </p:sp>
       <p:pic>
         <p:nvPicPr>
-          <p:cNvPr id="4" name="Picture 4" descr="Graphical user interface, application, website&#10;&#10;Description automatically generated">
+          <p:cNvPr id="5" name="Picture 5" descr="Graphical user interface, application, website&#10;&#10;Description automatically generated">
             <a:extLst>
               <a:ext uri="{FF2B5EF4-FFF2-40B4-BE49-F238E27FC236}">
-                <a16:creationId xmlns:a16="http://schemas.microsoft.com/office/drawing/2014/main" id="{7D389CBF-A676-8906-17AA-C4522821B01F}"/>
+                <a16:creationId xmlns:a16="http://schemas.microsoft.com/office/drawing/2014/main" id="{B29B4418-45C2-0DBC-1E25-04A4F473810B}"/>
               </a:ext>
             </a:extLst>
           </p:cNvPr>
@@ -15663,15 +16240,12 @@
         </p:blipFill>
         <p:spPr>
           <a:xfrm>
-            <a:off x="5269675" y="4317714"/>
-            <a:ext cx="5956764" cy="1102000"/>
+            <a:off x="6383896" y="4537436"/>
+            <a:ext cx="3955472" cy="696721"/>
           </a:xfrm>
           <a:prstGeom prst="rect">
             <a:avLst/>
           </a:prstGeom>
-          <a:ln w="9525">
-            <a:noFill/>
-          </a:ln>
         </p:spPr>
       </p:pic>
     </p:spTree>
@@ -15684,13 +16258,13 @@
   <p:clrMapOvr>
     <a:masterClrMapping/>
   </p:clrMapOvr>
-  <mc:AlternateContent xmlns:mc="http://schemas.openxmlformats.org/markup-compatibility/2006">
-    <mc:Choice xmlns:p14="http://schemas.microsoft.com/office/powerpoint/2010/main" Requires="p14">
+  <mc:AlternateContent xmlns:mc="http://schemas.openxmlformats.org/markup-compatibility/2006" xmlns:p14="http://schemas.microsoft.com/office/powerpoint/2010/main">
+    <mc:Choice Requires="p14">
       <p:transition spd="med" p14:dur="700">
         <p:fade/>
       </p:transition>
     </mc:Choice>
-    <mc:Fallback>
+    <mc:Fallback xmlns="">
       <p:transition spd="med">
         <p:fade/>
       </p:transition>
@@ -15699,7 +16273,7 @@
 </p:sld>
 </file>
 
-<file path=ppt/slides/slide7.xml><?xml version="1.0" encoding="utf-8"?>
+<file path=ppt/slides/slide9.xml><?xml version="1.0" encoding="utf-8"?>
 <p:sld xmlns:a="http://schemas.openxmlformats.org/drawingml/2006/main" xmlns:r="http://schemas.openxmlformats.org/officeDocument/2006/relationships" xmlns:p="http://schemas.openxmlformats.org/presentationml/2006/main">
   <p:cSld>
     <p:bg>
@@ -18018,13 +18592,13 @@
   <p:clrMapOvr>
     <a:masterClrMapping/>
   </p:clrMapOvr>
-  <mc:AlternateContent xmlns:mc="http://schemas.openxmlformats.org/markup-compatibility/2006">
-    <mc:Choice xmlns:p14="http://schemas.microsoft.com/office/powerpoint/2010/main" Requires="p14">
+  <mc:AlternateContent xmlns:mc="http://schemas.openxmlformats.org/markup-compatibility/2006" xmlns:p14="http://schemas.microsoft.com/office/powerpoint/2010/main">
+    <mc:Choice Requires="p14">
       <p:transition spd="med" p14:dur="700">
         <p:fade/>
       </p:transition>
     </mc:Choice>
-    <mc:Fallback>
+    <mc:Fallback xmlns="">
       <p:transition spd="med">
         <p:fade/>
       </p:transition>

</xml_diff>